<commit_message>
save before branch thread
</commit_message>
<xml_diff>
--- a/TETRIS_NEW_S/기획.pptx
+++ b/TETRIS_NEW_S/기획.pptx
@@ -8,6 +8,7 @@
     <p:sldId id="256" r:id="rId2"/>
     <p:sldId id="257" r:id="rId3"/>
     <p:sldId id="258" r:id="rId4"/>
+    <p:sldId id="259" r:id="rId5"/>
   </p:sldIdLst>
   <p:sldSz cx="10799763" cy="10799763"/>
   <p:notesSz cx="6858000" cy="9144000"/>
@@ -108,7 +109,7 @@
   </p:defaultTextStyle>
   <p:extLst>
     <p:ext uri="{EFAFB233-063F-42B5-8137-9DF3F51BA10A}">
-      <p15:sldGuideLst xmlns:p15="http://schemas.microsoft.com/office/powerpoint/2012/main"/>
+      <p15:sldGuideLst xmlns:p15="http://schemas.microsoft.com/office/powerpoint/2012/main" xmlns=""/>
     </p:ext>
   </p:extLst>
 </p:presentation>
@@ -245,7 +246,7 @@
           <a:p>
             <a:fld id="{7B4AEC64-C389-4369-9319-C0AE625A87B9}" type="datetimeFigureOut">
               <a:rPr lang="ko-KR" altLang="en-US" smtClean="0"/>
-              <a:t>2020-10-19</a:t>
+              <a:t>2020-10-20</a:t>
             </a:fld>
             <a:endParaRPr lang="ko-KR" altLang="en-US"/>
           </a:p>
@@ -415,7 +416,7 @@
           <a:p>
             <a:fld id="{7B4AEC64-C389-4369-9319-C0AE625A87B9}" type="datetimeFigureOut">
               <a:rPr lang="ko-KR" altLang="en-US" smtClean="0"/>
-              <a:t>2020-10-19</a:t>
+              <a:t>2020-10-20</a:t>
             </a:fld>
             <a:endParaRPr lang="ko-KR" altLang="en-US"/>
           </a:p>
@@ -595,7 +596,7 @@
           <a:p>
             <a:fld id="{7B4AEC64-C389-4369-9319-C0AE625A87B9}" type="datetimeFigureOut">
               <a:rPr lang="ko-KR" altLang="en-US" smtClean="0"/>
-              <a:t>2020-10-19</a:t>
+              <a:t>2020-10-20</a:t>
             </a:fld>
             <a:endParaRPr lang="ko-KR" altLang="en-US"/>
           </a:p>
@@ -765,7 +766,7 @@
           <a:p>
             <a:fld id="{7B4AEC64-C389-4369-9319-C0AE625A87B9}" type="datetimeFigureOut">
               <a:rPr lang="ko-KR" altLang="en-US" smtClean="0"/>
-              <a:t>2020-10-19</a:t>
+              <a:t>2020-10-20</a:t>
             </a:fld>
             <a:endParaRPr lang="ko-KR" altLang="en-US"/>
           </a:p>
@@ -1009,7 +1010,7 @@
           <a:p>
             <a:fld id="{7B4AEC64-C389-4369-9319-C0AE625A87B9}" type="datetimeFigureOut">
               <a:rPr lang="ko-KR" altLang="en-US" smtClean="0"/>
-              <a:t>2020-10-19</a:t>
+              <a:t>2020-10-20</a:t>
             </a:fld>
             <a:endParaRPr lang="ko-KR" altLang="en-US"/>
           </a:p>
@@ -1241,7 +1242,7 @@
           <a:p>
             <a:fld id="{7B4AEC64-C389-4369-9319-C0AE625A87B9}" type="datetimeFigureOut">
               <a:rPr lang="ko-KR" altLang="en-US" smtClean="0"/>
-              <a:t>2020-10-19</a:t>
+              <a:t>2020-10-20</a:t>
             </a:fld>
             <a:endParaRPr lang="ko-KR" altLang="en-US"/>
           </a:p>
@@ -1608,7 +1609,7 @@
           <a:p>
             <a:fld id="{7B4AEC64-C389-4369-9319-C0AE625A87B9}" type="datetimeFigureOut">
               <a:rPr lang="ko-KR" altLang="en-US" smtClean="0"/>
-              <a:t>2020-10-19</a:t>
+              <a:t>2020-10-20</a:t>
             </a:fld>
             <a:endParaRPr lang="ko-KR" altLang="en-US"/>
           </a:p>
@@ -1726,7 +1727,7 @@
           <a:p>
             <a:fld id="{7B4AEC64-C389-4369-9319-C0AE625A87B9}" type="datetimeFigureOut">
               <a:rPr lang="ko-KR" altLang="en-US" smtClean="0"/>
-              <a:t>2020-10-19</a:t>
+              <a:t>2020-10-20</a:t>
             </a:fld>
             <a:endParaRPr lang="ko-KR" altLang="en-US"/>
           </a:p>
@@ -1821,7 +1822,7 @@
           <a:p>
             <a:fld id="{7B4AEC64-C389-4369-9319-C0AE625A87B9}" type="datetimeFigureOut">
               <a:rPr lang="ko-KR" altLang="en-US" smtClean="0"/>
-              <a:t>2020-10-19</a:t>
+              <a:t>2020-10-20</a:t>
             </a:fld>
             <a:endParaRPr lang="ko-KR" altLang="en-US"/>
           </a:p>
@@ -2098,7 +2099,7 @@
           <a:p>
             <a:fld id="{7B4AEC64-C389-4369-9319-C0AE625A87B9}" type="datetimeFigureOut">
               <a:rPr lang="ko-KR" altLang="en-US" smtClean="0"/>
-              <a:t>2020-10-19</a:t>
+              <a:t>2020-10-20</a:t>
             </a:fld>
             <a:endParaRPr lang="ko-KR" altLang="en-US"/>
           </a:p>
@@ -2355,7 +2356,7 @@
           <a:p>
             <a:fld id="{7B4AEC64-C389-4369-9319-C0AE625A87B9}" type="datetimeFigureOut">
               <a:rPr lang="ko-KR" altLang="en-US" smtClean="0"/>
-              <a:t>2020-10-19</a:t>
+              <a:t>2020-10-20</a:t>
             </a:fld>
             <a:endParaRPr lang="ko-KR" altLang="en-US"/>
           </a:p>
@@ -2568,7 +2569,7 @@
           <a:p>
             <a:fld id="{7B4AEC64-C389-4369-9319-C0AE625A87B9}" type="datetimeFigureOut">
               <a:rPr lang="ko-KR" altLang="en-US" smtClean="0"/>
-              <a:t>2020-10-19</a:t>
+              <a:t>2020-10-20</a:t>
             </a:fld>
             <a:endParaRPr lang="ko-KR" altLang="en-US"/>
           </a:p>
@@ -4236,6 +4237,78 @@
           </a:fontRef>
         </p:style>
       </p:cxnSp>
+      <p:cxnSp>
+        <p:nvCxnSpPr>
+          <p:cNvPr id="3" name="직선 화살표 연결선 2"/>
+          <p:cNvCxnSpPr>
+            <a:stCxn id="4" idx="2"/>
+            <a:endCxn id="5" idx="0"/>
+          </p:cNvCxnSpPr>
+          <p:nvPr/>
+        </p:nvCxnSpPr>
+        <p:spPr>
+          <a:xfrm flipH="1">
+            <a:off x="2253804" y="836496"/>
+            <a:ext cx="3146078" cy="394053"/>
+          </a:xfrm>
+          <a:prstGeom prst="straightConnector1">
+            <a:avLst/>
+          </a:prstGeom>
+          <a:ln>
+            <a:tailEnd type="arrow"/>
+          </a:ln>
+        </p:spPr>
+        <p:style>
+          <a:lnRef idx="1">
+            <a:schemeClr val="accent1"/>
+          </a:lnRef>
+          <a:fillRef idx="0">
+            <a:schemeClr val="accent1"/>
+          </a:fillRef>
+          <a:effectRef idx="0">
+            <a:schemeClr val="accent1"/>
+          </a:effectRef>
+          <a:fontRef idx="minor">
+            <a:schemeClr val="tx1"/>
+          </a:fontRef>
+        </p:style>
+      </p:cxnSp>
+      <p:cxnSp>
+        <p:nvCxnSpPr>
+          <p:cNvPr id="18" name="직선 화살표 연결선 17"/>
+          <p:cNvCxnSpPr>
+            <a:stCxn id="4" idx="2"/>
+            <a:endCxn id="6" idx="0"/>
+          </p:cNvCxnSpPr>
+          <p:nvPr/>
+        </p:nvCxnSpPr>
+        <p:spPr>
+          <a:xfrm>
+            <a:off x="5399882" y="836496"/>
+            <a:ext cx="3177469" cy="394053"/>
+          </a:xfrm>
+          <a:prstGeom prst="straightConnector1">
+            <a:avLst/>
+          </a:prstGeom>
+          <a:ln>
+            <a:tailEnd type="arrow"/>
+          </a:ln>
+        </p:spPr>
+        <p:style>
+          <a:lnRef idx="1">
+            <a:schemeClr val="accent1"/>
+          </a:lnRef>
+          <a:fillRef idx="0">
+            <a:schemeClr val="accent1"/>
+          </a:fillRef>
+          <a:effectRef idx="0">
+            <a:schemeClr val="accent1"/>
+          </a:effectRef>
+          <a:fontRef idx="minor">
+            <a:schemeClr val="tx1"/>
+          </a:fontRef>
+        </p:style>
+      </p:cxnSp>
     </p:spTree>
     <p:extLst>
       <p:ext uri="{BB962C8B-B14F-4D97-AF65-F5344CB8AC3E}">
@@ -4294,14 +4367,14 @@
                 <a:gridCol w="5558973">
                   <a:extLst>
                     <a:ext uri="{9D8B030D-6E8A-4147-A177-3AD203B41FA5}">
-                      <a16:colId xmlns:a16="http://schemas.microsoft.com/office/drawing/2014/main" val="20000"/>
+                      <a16:colId xmlns:a16="http://schemas.microsoft.com/office/drawing/2014/main" xmlns="" val="20000"/>
                     </a:ext>
                   </a:extLst>
                 </a:gridCol>
                 <a:gridCol w="5240791">
                   <a:extLst>
                     <a:ext uri="{9D8B030D-6E8A-4147-A177-3AD203B41FA5}">
-                      <a16:colId xmlns:a16="http://schemas.microsoft.com/office/drawing/2014/main" val="20001"/>
+                      <a16:colId xmlns:a16="http://schemas.microsoft.com/office/drawing/2014/main" xmlns="" val="20001"/>
                     </a:ext>
                   </a:extLst>
                 </a:gridCol>
@@ -4431,7 +4504,7 @@
                 </a:tc>
                 <a:extLst>
                   <a:ext uri="{0D108BD9-81ED-4DB2-BD59-A6C34878D82A}">
-                    <a16:rowId xmlns:a16="http://schemas.microsoft.com/office/drawing/2014/main" val="10000"/>
+                    <a16:rowId xmlns:a16="http://schemas.microsoft.com/office/drawing/2014/main" xmlns="" val="10000"/>
                   </a:ext>
                 </a:extLst>
               </a:tr>
@@ -4460,7 +4533,7 @@
                 </a:tc>
                 <a:extLst>
                   <a:ext uri="{0D108BD9-81ED-4DB2-BD59-A6C34878D82A}">
-                    <a16:rowId xmlns:a16="http://schemas.microsoft.com/office/drawing/2014/main" val="10001"/>
+                    <a16:rowId xmlns:a16="http://schemas.microsoft.com/office/drawing/2014/main" xmlns="" val="10001"/>
                   </a:ext>
                 </a:extLst>
               </a:tr>
@@ -4503,7 +4576,7 @@
           <p:cNvPr id="1026" name="Picture 2" descr="게임제작개론 : #6 게임 시스템 구조에 대한 이해">
             <a:extLst>
               <a:ext uri="{FF2B5EF4-FFF2-40B4-BE49-F238E27FC236}">
-                <a16:creationId xmlns:a16="http://schemas.microsoft.com/office/drawing/2014/main" id="{5AA2E3DF-9B1B-42F8-87D8-4867D943D1DD}"/>
+                <a16:creationId xmlns:a16="http://schemas.microsoft.com/office/drawing/2014/main" xmlns="" id="{5AA2E3DF-9B1B-42F8-87D8-4867D943D1DD}"/>
               </a:ext>
             </a:extLst>
           </p:cNvPr>
@@ -4547,6 +4620,66 @@
     <p:extLst>
       <p:ext uri="{BB962C8B-B14F-4D97-AF65-F5344CB8AC3E}">
         <p14:creationId xmlns:p14="http://schemas.microsoft.com/office/powerpoint/2010/main" val="1086216612"/>
+      </p:ext>
+    </p:extLst>
+  </p:cSld>
+  <p:clrMapOvr>
+    <a:masterClrMapping/>
+  </p:clrMapOvr>
+</p:sld>
+</file>
+
+<file path=ppt/slides/slide4.xml><?xml version="1.0" encoding="utf-8"?>
+<p:sld xmlns:a="http://schemas.openxmlformats.org/drawingml/2006/main" xmlns:r="http://schemas.openxmlformats.org/officeDocument/2006/relationships" xmlns:p="http://schemas.openxmlformats.org/presentationml/2006/main">
+  <p:cSld>
+    <p:spTree>
+      <p:nvGrpSpPr>
+        <p:cNvPr id="1" name=""/>
+        <p:cNvGrpSpPr/>
+        <p:nvPr/>
+      </p:nvGrpSpPr>
+      <p:grpSpPr>
+        <a:xfrm>
+          <a:off x="0" y="0"/>
+          <a:ext cx="0" cy="0"/>
+          <a:chOff x="0" y="0"/>
+          <a:chExt cx="0" cy="0"/>
+        </a:xfrm>
+      </p:grpSpPr>
+      <p:sp>
+        <p:nvSpPr>
+          <p:cNvPr id="4" name="TextBox 3"/>
+          <p:cNvSpPr txBox="1"/>
+          <p:nvPr/>
+        </p:nvSpPr>
+        <p:spPr>
+          <a:xfrm>
+            <a:off x="0" y="0"/>
+            <a:ext cx="1027012" cy="461665"/>
+          </a:xfrm>
+          <a:prstGeom prst="rect">
+            <a:avLst/>
+          </a:prstGeom>
+          <a:noFill/>
+        </p:spPr>
+        <p:txBody>
+          <a:bodyPr wrap="none" rtlCol="0">
+            <a:spAutoFit/>
+          </a:bodyPr>
+          <a:lstStyle/>
+          <a:p>
+            <a:r>
+              <a:rPr lang="en-US" altLang="ko-KR" sz="2400" dirty="0" smtClean="0"/>
+              <a:t>render</a:t>
+            </a:r>
+            <a:endParaRPr lang="ko-KR" altLang="en-US" sz="2400" dirty="0"/>
+          </a:p>
+        </p:txBody>
+      </p:sp>
+    </p:spTree>
+    <p:extLst>
+      <p:ext uri="{BB962C8B-B14F-4D97-AF65-F5344CB8AC3E}">
+        <p14:creationId xmlns:p14="http://schemas.microsoft.com/office/powerpoint/2010/main" val="3087337261"/>
       </p:ext>
     </p:extLst>
   </p:cSld>
@@ -4811,7 +4944,7 @@
   <a:extraClrSchemeLst/>
   <a:extLst>
     <a:ext uri="{05A4C25C-085E-4340-85A3-A5531E510DB2}">
-      <thm15:themeFamily xmlns:thm15="http://schemas.microsoft.com/office/thememl/2012/main" name="Office Theme" id="{62F939B6-93AF-4DB8-9C6B-D6C7DFDC589F}" vid="{4A3C46E8-61CC-4603-A589-7422A47A8E4A}"/>
+      <thm15:themeFamily xmlns:thm15="http://schemas.microsoft.com/office/thememl/2012/main" xmlns="" name="Office Theme" id="{62F939B6-93AF-4DB8-9C6B-D6C7DFDC589F}" vid="{4A3C46E8-61CC-4603-A589-7422A47A8E4A}"/>
     </a:ext>
   </a:extLst>
 </a:theme>

</xml_diff>